<commit_message>
Layout details: centered text on all the KVA cards & on the 'Don't measure output' statement card (slide 57).
</commit_message>
<xml_diff>
--- a/Measuring Outcome.pptx
+++ b/Measuring Outcome.pptx
@@ -287,7 +287,7 @@
           <a:p>
             <a:fld id="{BC4EB6E1-6DC5-DF49-9A9A-F4C85D0F08E3}" type="datetimeFigureOut">
               <a:rPr lang="en-NL" smtClean="0"/>
-              <a:t>19/06/2020</a:t>
+              <a:t>22/06/2020</a:t>
             </a:fld>
             <a:endParaRPr lang="en-NL"/>
           </a:p>
@@ -1022,7 +1022,7 @@
           <a:p>
             <a:fld id="{E73D112B-1218-6940-8ADF-F626DEEE2DDF}" type="datetimeFigureOut">
               <a:rPr lang="en-NL" smtClean="0"/>
-              <a:t>19/06/2020</a:t>
+              <a:t>22/06/2020</a:t>
             </a:fld>
             <a:endParaRPr lang="en-NL"/>
           </a:p>
@@ -1192,7 +1192,7 @@
           <a:p>
             <a:fld id="{E73D112B-1218-6940-8ADF-F626DEEE2DDF}" type="datetimeFigureOut">
               <a:rPr lang="en-NL" smtClean="0"/>
-              <a:t>19/06/2020</a:t>
+              <a:t>22/06/2020</a:t>
             </a:fld>
             <a:endParaRPr lang="en-NL"/>
           </a:p>
@@ -1372,7 +1372,7 @@
           <a:p>
             <a:fld id="{E73D112B-1218-6940-8ADF-F626DEEE2DDF}" type="datetimeFigureOut">
               <a:rPr lang="en-NL" smtClean="0"/>
-              <a:t>19/06/2020</a:t>
+              <a:t>22/06/2020</a:t>
             </a:fld>
             <a:endParaRPr lang="en-NL"/>
           </a:p>
@@ -1542,7 +1542,7 @@
           <a:p>
             <a:fld id="{E73D112B-1218-6940-8ADF-F626DEEE2DDF}" type="datetimeFigureOut">
               <a:rPr lang="en-NL" smtClean="0"/>
-              <a:t>19/06/2020</a:t>
+              <a:t>22/06/2020</a:t>
             </a:fld>
             <a:endParaRPr lang="en-NL"/>
           </a:p>
@@ -1786,7 +1786,7 @@
           <a:p>
             <a:fld id="{E73D112B-1218-6940-8ADF-F626DEEE2DDF}" type="datetimeFigureOut">
               <a:rPr lang="en-NL" smtClean="0"/>
-              <a:t>19/06/2020</a:t>
+              <a:t>22/06/2020</a:t>
             </a:fld>
             <a:endParaRPr lang="en-NL"/>
           </a:p>
@@ -2018,7 +2018,7 @@
           <a:p>
             <a:fld id="{E73D112B-1218-6940-8ADF-F626DEEE2DDF}" type="datetimeFigureOut">
               <a:rPr lang="en-NL" smtClean="0"/>
-              <a:t>19/06/2020</a:t>
+              <a:t>22/06/2020</a:t>
             </a:fld>
             <a:endParaRPr lang="en-NL"/>
           </a:p>
@@ -2385,7 +2385,7 @@
           <a:p>
             <a:fld id="{E73D112B-1218-6940-8ADF-F626DEEE2DDF}" type="datetimeFigureOut">
               <a:rPr lang="en-NL" smtClean="0"/>
-              <a:t>19/06/2020</a:t>
+              <a:t>22/06/2020</a:t>
             </a:fld>
             <a:endParaRPr lang="en-NL"/>
           </a:p>
@@ -2503,7 +2503,7 @@
           <a:p>
             <a:fld id="{E73D112B-1218-6940-8ADF-F626DEEE2DDF}" type="datetimeFigureOut">
               <a:rPr lang="en-NL" smtClean="0"/>
-              <a:t>19/06/2020</a:t>
+              <a:t>22/06/2020</a:t>
             </a:fld>
             <a:endParaRPr lang="en-NL"/>
           </a:p>
@@ -2598,7 +2598,7 @@
           <a:p>
             <a:fld id="{E73D112B-1218-6940-8ADF-F626DEEE2DDF}" type="datetimeFigureOut">
               <a:rPr lang="en-NL" smtClean="0"/>
-              <a:t>19/06/2020</a:t>
+              <a:t>22/06/2020</a:t>
             </a:fld>
             <a:endParaRPr lang="en-NL"/>
           </a:p>
@@ -2875,7 +2875,7 @@
           <a:p>
             <a:fld id="{E73D112B-1218-6940-8ADF-F626DEEE2DDF}" type="datetimeFigureOut">
               <a:rPr lang="en-NL" smtClean="0"/>
-              <a:t>19/06/2020</a:t>
+              <a:t>22/06/2020</a:t>
             </a:fld>
             <a:endParaRPr lang="en-NL"/>
           </a:p>
@@ -3132,7 +3132,7 @@
           <a:p>
             <a:fld id="{E73D112B-1218-6940-8ADF-F626DEEE2DDF}" type="datetimeFigureOut">
               <a:rPr lang="en-NL" smtClean="0"/>
-              <a:t>19/06/2020</a:t>
+              <a:t>22/06/2020</a:t>
             </a:fld>
             <a:endParaRPr lang="en-NL"/>
           </a:p>
@@ -3345,7 +3345,7 @@
           <a:p>
             <a:fld id="{E73D112B-1218-6940-8ADF-F626DEEE2DDF}" type="datetimeFigureOut">
               <a:rPr lang="en-NL" smtClean="0"/>
-              <a:t>19/06/2020</a:t>
+              <a:t>22/06/2020</a:t>
             </a:fld>
             <a:endParaRPr lang="en-NL"/>
           </a:p>
@@ -9954,8 +9954,8 @@
         </p:nvSpPr>
         <p:spPr>
           <a:xfrm>
-            <a:off x="1886841" y="3029919"/>
-            <a:ext cx="3861955" cy="246221"/>
+            <a:off x="2076797" y="3029919"/>
+            <a:ext cx="3482043" cy="246221"/>
           </a:xfrm>
           <a:prstGeom prst="rect">
             <a:avLst/>
@@ -9968,6 +9968,7 @@
           </a:bodyPr>
           <a:lstStyle/>
           <a:p>
+            <a:pPr algn="ctr"/>
             <a:r>
               <a:rPr lang="en-GB" sz="1000" dirty="0">
                 <a:solidFill>
@@ -16004,8 +16005,8 @@
         </p:nvSpPr>
         <p:spPr>
           <a:xfrm>
-            <a:off x="1083738" y="2983424"/>
-            <a:ext cx="5468164" cy="246221"/>
+            <a:off x="1358653" y="2983424"/>
+            <a:ext cx="4918334" cy="246221"/>
           </a:xfrm>
           <a:prstGeom prst="rect">
             <a:avLst/>
@@ -16018,6 +16019,7 @@
           </a:bodyPr>
           <a:lstStyle/>
           <a:p>
+            <a:pPr algn="ctr"/>
             <a:r>
               <a:rPr lang="en-GB" sz="1000" dirty="0">
                 <a:solidFill>
@@ -18557,7 +18559,7 @@
         </p:nvSpPr>
         <p:spPr>
           <a:xfrm>
-            <a:off x="329715" y="1463496"/>
+            <a:off x="329715" y="1848217"/>
             <a:ext cx="6900243" cy="1631216"/>
           </a:xfrm>
           <a:prstGeom prst="rect">
@@ -20097,9 +20099,9 @@
         <p:grpSpPr>
           <a:xfrm>
             <a:off x="394567" y="1487920"/>
-            <a:ext cx="8604506" cy="2170630"/>
+            <a:ext cx="8604506" cy="2181674"/>
             <a:chOff x="394567" y="1604155"/>
-            <a:chExt cx="8604506" cy="2170630"/>
+            <a:chExt cx="8604506" cy="2181674"/>
           </a:xfrm>
         </p:grpSpPr>
         <p:sp>
@@ -20191,8 +20193,8 @@
           </p:nvSpPr>
           <p:spPr>
             <a:xfrm>
-              <a:off x="1876423" y="3374675"/>
-              <a:ext cx="3882794" cy="400110"/>
+              <a:off x="1931029" y="3385719"/>
+              <a:ext cx="3697615" cy="400110"/>
             </a:xfrm>
             <a:prstGeom prst="rect">
               <a:avLst/>
@@ -20205,6 +20207,7 @@
             </a:bodyPr>
             <a:lstStyle/>
             <a:p>
+              <a:pPr algn="ctr"/>
               <a:r>
                 <a:rPr lang="en-GB" sz="1000" dirty="0">
                   <a:solidFill>

</xml_diff>

<commit_message>
Added version nr in the explanation card as part of the licensing sentence. Rationale for numbering: this is v1.0.1 since this has no substantial content changes. We will have to discuss a bit more to align on our versioning strategy :-)
</commit_message>
<xml_diff>
--- a/Measuring Outcome.pptx
+++ b/Measuring Outcome.pptx
@@ -6713,7 +6713,7 @@
         </p:blipFill>
         <p:spPr>
           <a:xfrm>
-            <a:off x="4991437" y="3475952"/>
+            <a:off x="4991437" y="3324877"/>
             <a:ext cx="1377557" cy="570453"/>
           </a:xfrm>
           <a:prstGeom prst="rect">
@@ -6744,7 +6744,7 @@
         <p:spPr>
           <a:xfrm>
             <a:off x="4555669" y="-324090"/>
-            <a:ext cx="2268599" cy="2505165"/>
+            <a:ext cx="2268599" cy="2232403"/>
           </a:xfrm>
           <a:prstGeom prst="rect">
             <a:avLst/>
@@ -6765,7 +6765,7 @@
         </p:nvSpPr>
         <p:spPr>
           <a:xfrm>
-            <a:off x="4029052" y="1517824"/>
+            <a:off x="4029052" y="1366749"/>
             <a:ext cx="3305328" cy="2169825"/>
           </a:xfrm>
           <a:prstGeom prst="rect">
@@ -7076,7 +7076,7 @@
         </p:nvSpPr>
         <p:spPr>
           <a:xfrm>
-            <a:off x="4294481" y="4046405"/>
+            <a:off x="4294481" y="3895330"/>
             <a:ext cx="2771468" cy="738664"/>
           </a:xfrm>
           <a:prstGeom prst="rect">
@@ -7154,7 +7154,25 @@
                 </a:solidFill>
                 <a:latin typeface="Ubuntu Light" panose="020B0304030602030204" pitchFamily="34" charset="0"/>
               </a:rPr>
-              <a:t>The Measuring Outcome game is licensed under </a:t>
+              <a:t>The Measuring </a:t>
+            </a:r>
+            <a:r>
+              <a:rPr lang="en-GB" sz="700">
+                <a:solidFill>
+                  <a:schemeClr val="bg1"/>
+                </a:solidFill>
+                <a:latin typeface="Ubuntu Light" panose="020B0304030602030204" pitchFamily="34" charset="0"/>
+              </a:rPr>
+              <a:t>Outcome game (v1.0.1) </a:t>
+            </a:r>
+            <a:r>
+              <a:rPr lang="en-GB" sz="700" dirty="0">
+                <a:solidFill>
+                  <a:schemeClr val="bg1"/>
+                </a:solidFill>
+                <a:latin typeface="Ubuntu Light" panose="020B0304030602030204" pitchFamily="34" charset="0"/>
+              </a:rPr>
+              <a:t>is licensed under </a:t>
             </a:r>
           </a:p>
           <a:p>

</xml_diff>

<commit_message>
Proper centering for takeaway "Don’t measure Output. Measure Outcomes" & consequently bumped to v1.0.2 (no meaningful changes, just a deisgn bug fixed)
</commit_message>
<xml_diff>
--- a/Measuring Outcome.pptx
+++ b/Measuring Outcome.pptx
@@ -287,7 +287,7 @@
           <a:p>
             <a:fld id="{BC4EB6E1-6DC5-DF49-9A9A-F4C85D0F08E3}" type="datetimeFigureOut">
               <a:rPr lang="en-NL" smtClean="0"/>
-              <a:t>22/06/2020</a:t>
+              <a:t>08/07/2020</a:t>
             </a:fld>
             <a:endParaRPr lang="en-NL"/>
           </a:p>
@@ -1022,7 +1022,7 @@
           <a:p>
             <a:fld id="{E73D112B-1218-6940-8ADF-F626DEEE2DDF}" type="datetimeFigureOut">
               <a:rPr lang="en-NL" smtClean="0"/>
-              <a:t>22/06/2020</a:t>
+              <a:t>08/07/2020</a:t>
             </a:fld>
             <a:endParaRPr lang="en-NL"/>
           </a:p>
@@ -1192,7 +1192,7 @@
           <a:p>
             <a:fld id="{E73D112B-1218-6940-8ADF-F626DEEE2DDF}" type="datetimeFigureOut">
               <a:rPr lang="en-NL" smtClean="0"/>
-              <a:t>22/06/2020</a:t>
+              <a:t>08/07/2020</a:t>
             </a:fld>
             <a:endParaRPr lang="en-NL"/>
           </a:p>
@@ -1372,7 +1372,7 @@
           <a:p>
             <a:fld id="{E73D112B-1218-6940-8ADF-F626DEEE2DDF}" type="datetimeFigureOut">
               <a:rPr lang="en-NL" smtClean="0"/>
-              <a:t>22/06/2020</a:t>
+              <a:t>08/07/2020</a:t>
             </a:fld>
             <a:endParaRPr lang="en-NL"/>
           </a:p>
@@ -1542,7 +1542,7 @@
           <a:p>
             <a:fld id="{E73D112B-1218-6940-8ADF-F626DEEE2DDF}" type="datetimeFigureOut">
               <a:rPr lang="en-NL" smtClean="0"/>
-              <a:t>22/06/2020</a:t>
+              <a:t>08/07/2020</a:t>
             </a:fld>
             <a:endParaRPr lang="en-NL"/>
           </a:p>
@@ -1786,7 +1786,7 @@
           <a:p>
             <a:fld id="{E73D112B-1218-6940-8ADF-F626DEEE2DDF}" type="datetimeFigureOut">
               <a:rPr lang="en-NL" smtClean="0"/>
-              <a:t>22/06/2020</a:t>
+              <a:t>08/07/2020</a:t>
             </a:fld>
             <a:endParaRPr lang="en-NL"/>
           </a:p>
@@ -2018,7 +2018,7 @@
           <a:p>
             <a:fld id="{E73D112B-1218-6940-8ADF-F626DEEE2DDF}" type="datetimeFigureOut">
               <a:rPr lang="en-NL" smtClean="0"/>
-              <a:t>22/06/2020</a:t>
+              <a:t>08/07/2020</a:t>
             </a:fld>
             <a:endParaRPr lang="en-NL"/>
           </a:p>
@@ -2385,7 +2385,7 @@
           <a:p>
             <a:fld id="{E73D112B-1218-6940-8ADF-F626DEEE2DDF}" type="datetimeFigureOut">
               <a:rPr lang="en-NL" smtClean="0"/>
-              <a:t>22/06/2020</a:t>
+              <a:t>08/07/2020</a:t>
             </a:fld>
             <a:endParaRPr lang="en-NL"/>
           </a:p>
@@ -2503,7 +2503,7 @@
           <a:p>
             <a:fld id="{E73D112B-1218-6940-8ADF-F626DEEE2DDF}" type="datetimeFigureOut">
               <a:rPr lang="en-NL" smtClean="0"/>
-              <a:t>22/06/2020</a:t>
+              <a:t>08/07/2020</a:t>
             </a:fld>
             <a:endParaRPr lang="en-NL"/>
           </a:p>
@@ -2598,7 +2598,7 @@
           <a:p>
             <a:fld id="{E73D112B-1218-6940-8ADF-F626DEEE2DDF}" type="datetimeFigureOut">
               <a:rPr lang="en-NL" smtClean="0"/>
-              <a:t>22/06/2020</a:t>
+              <a:t>08/07/2020</a:t>
             </a:fld>
             <a:endParaRPr lang="en-NL"/>
           </a:p>
@@ -2875,7 +2875,7 @@
           <a:p>
             <a:fld id="{E73D112B-1218-6940-8ADF-F626DEEE2DDF}" type="datetimeFigureOut">
               <a:rPr lang="en-NL" smtClean="0"/>
-              <a:t>22/06/2020</a:t>
+              <a:t>08/07/2020</a:t>
             </a:fld>
             <a:endParaRPr lang="en-NL"/>
           </a:p>
@@ -3132,7 +3132,7 @@
           <a:p>
             <a:fld id="{E73D112B-1218-6940-8ADF-F626DEEE2DDF}" type="datetimeFigureOut">
               <a:rPr lang="en-NL" smtClean="0"/>
-              <a:t>22/06/2020</a:t>
+              <a:t>08/07/2020</a:t>
             </a:fld>
             <a:endParaRPr lang="en-NL"/>
           </a:p>
@@ -3345,7 +3345,7 @@
           <a:p>
             <a:fld id="{E73D112B-1218-6940-8ADF-F626DEEE2DDF}" type="datetimeFigureOut">
               <a:rPr lang="en-NL" smtClean="0"/>
-              <a:t>22/06/2020</a:t>
+              <a:t>08/07/2020</a:t>
             </a:fld>
             <a:endParaRPr lang="en-NL"/>
           </a:p>
@@ -7163,7 +7163,7 @@
                 </a:solidFill>
                 <a:latin typeface="Ubuntu Light" panose="020B0304030602030204" pitchFamily="34" charset="0"/>
               </a:rPr>
-              <a:t>Outcome game (v1.0.1) </a:t>
+              <a:t>Outcome game (v1.0.2) </a:t>
             </a:r>
             <a:r>
               <a:rPr lang="en-GB" sz="700" dirty="0">
@@ -18577,8 +18577,8 @@
         </p:nvSpPr>
         <p:spPr>
           <a:xfrm>
-            <a:off x="329715" y="1848217"/>
-            <a:ext cx="6900243" cy="1631216"/>
+            <a:off x="329715" y="1463496"/>
+            <a:ext cx="6900243" cy="2400657"/>
           </a:xfrm>
           <a:prstGeom prst="rect">
             <a:avLst/>

</xml_diff>